<commit_message>
The Jacob's well tutorial is updated
</commit_message>
<xml_diff>
--- a/Documentation/HydroDesktop Tutorial - Jacob's Well pics.pptx
+++ b/Documentation/HydroDesktop Tutorial - Jacob's Well pics.pptx
@@ -296,7 +296,7 @@
             <a:fld id="{1D8BD707-D9CF-40AE-B4C6-C98DA3205C09}" type="datetimeFigureOut">
               <a:rPr lang="en-US" smtClean="0"/>
               <a:pPr/>
-              <a:t>2/15/2012</a:t>
+              <a:t>2/22/2012</a:t>
             </a:fld>
             <a:endParaRPr lang="en-US"/>
           </a:p>
@@ -463,7 +463,7 @@
             <a:fld id="{1D8BD707-D9CF-40AE-B4C6-C98DA3205C09}" type="datetimeFigureOut">
               <a:rPr lang="en-US" smtClean="0"/>
               <a:pPr/>
-              <a:t>2/15/2012</a:t>
+              <a:t>2/22/2012</a:t>
             </a:fld>
             <a:endParaRPr lang="en-US"/>
           </a:p>
@@ -640,7 +640,7 @@
             <a:fld id="{1D8BD707-D9CF-40AE-B4C6-C98DA3205C09}" type="datetimeFigureOut">
               <a:rPr lang="en-US" smtClean="0"/>
               <a:pPr/>
-              <a:t>2/15/2012</a:t>
+              <a:t>2/22/2012</a:t>
             </a:fld>
             <a:endParaRPr lang="en-US"/>
           </a:p>
@@ -807,7 +807,7 @@
             <a:fld id="{1D8BD707-D9CF-40AE-B4C6-C98DA3205C09}" type="datetimeFigureOut">
               <a:rPr lang="en-US" smtClean="0"/>
               <a:pPr/>
-              <a:t>2/15/2012</a:t>
+              <a:t>2/22/2012</a:t>
             </a:fld>
             <a:endParaRPr lang="en-US"/>
           </a:p>
@@ -1050,7 +1050,7 @@
             <a:fld id="{1D8BD707-D9CF-40AE-B4C6-C98DA3205C09}" type="datetimeFigureOut">
               <a:rPr lang="en-US" smtClean="0"/>
               <a:pPr/>
-              <a:t>2/15/2012</a:t>
+              <a:t>2/22/2012</a:t>
             </a:fld>
             <a:endParaRPr lang="en-US"/>
           </a:p>
@@ -1335,7 +1335,7 @@
             <a:fld id="{1D8BD707-D9CF-40AE-B4C6-C98DA3205C09}" type="datetimeFigureOut">
               <a:rPr lang="en-US" smtClean="0"/>
               <a:pPr/>
-              <a:t>2/15/2012</a:t>
+              <a:t>2/22/2012</a:t>
             </a:fld>
             <a:endParaRPr lang="en-US"/>
           </a:p>
@@ -1754,7 +1754,7 @@
             <a:fld id="{1D8BD707-D9CF-40AE-B4C6-C98DA3205C09}" type="datetimeFigureOut">
               <a:rPr lang="en-US" smtClean="0"/>
               <a:pPr/>
-              <a:t>2/15/2012</a:t>
+              <a:t>2/22/2012</a:t>
             </a:fld>
             <a:endParaRPr lang="en-US"/>
           </a:p>
@@ -1869,7 +1869,7 @@
             <a:fld id="{1D8BD707-D9CF-40AE-B4C6-C98DA3205C09}" type="datetimeFigureOut">
               <a:rPr lang="en-US" smtClean="0"/>
               <a:pPr/>
-              <a:t>2/15/2012</a:t>
+              <a:t>2/22/2012</a:t>
             </a:fld>
             <a:endParaRPr lang="en-US"/>
           </a:p>
@@ -1961,7 +1961,7 @@
             <a:fld id="{1D8BD707-D9CF-40AE-B4C6-C98DA3205C09}" type="datetimeFigureOut">
               <a:rPr lang="en-US" smtClean="0"/>
               <a:pPr/>
-              <a:t>2/15/2012</a:t>
+              <a:t>2/22/2012</a:t>
             </a:fld>
             <a:endParaRPr lang="en-US"/>
           </a:p>
@@ -2235,7 +2235,7 @@
             <a:fld id="{1D8BD707-D9CF-40AE-B4C6-C98DA3205C09}" type="datetimeFigureOut">
               <a:rPr lang="en-US" smtClean="0"/>
               <a:pPr/>
-              <a:t>2/15/2012</a:t>
+              <a:t>2/22/2012</a:t>
             </a:fld>
             <a:endParaRPr lang="en-US"/>
           </a:p>
@@ -2485,7 +2485,7 @@
             <a:fld id="{1D8BD707-D9CF-40AE-B4C6-C98DA3205C09}" type="datetimeFigureOut">
               <a:rPr lang="en-US" smtClean="0"/>
               <a:pPr/>
-              <a:t>2/15/2012</a:t>
+              <a:t>2/22/2012</a:t>
             </a:fld>
             <a:endParaRPr lang="en-US"/>
           </a:p>
@@ -2695,7 +2695,7 @@
             <a:fld id="{1D8BD707-D9CF-40AE-B4C6-C98DA3205C09}" type="datetimeFigureOut">
               <a:rPr lang="en-US" smtClean="0"/>
               <a:pPr/>
-              <a:t>2/15/2012</a:t>
+              <a:t>2/22/2012</a:t>
             </a:fld>
             <a:endParaRPr lang="en-US"/>
           </a:p>
@@ -9182,7 +9182,7 @@
       </p:grpSpPr>
       <p:pic>
         <p:nvPicPr>
-          <p:cNvPr id="4098" name="Picture 2"/>
+          <p:cNvPr id="1027" name="Picture 3"/>
           <p:cNvPicPr>
             <a:picLocks noChangeAspect="1" noChangeArrowheads="1"/>
           </p:cNvPicPr>
@@ -9203,8 +9203,8 @@
         </p:blipFill>
         <p:spPr bwMode="auto">
           <a:xfrm>
-            <a:off x="600075" y="704850"/>
-            <a:ext cx="7315200" cy="5486400"/>
+            <a:off x="137160" y="328612"/>
+            <a:ext cx="8549640" cy="6072188"/>
           </a:xfrm>
           <a:prstGeom prst="rect">
             <a:avLst/>
@@ -9252,7 +9252,7 @@
         </p:nvSpPr>
         <p:spPr>
           <a:xfrm>
-            <a:off x="4800600" y="2209800"/>
+            <a:off x="5105400" y="2209800"/>
             <a:ext cx="914400" cy="457200"/>
           </a:xfrm>
           <a:prstGeom prst="roundRect">
@@ -9321,7 +9321,7 @@
         </p:nvCxnSpPr>
         <p:spPr>
           <a:xfrm rot="10800000" flipV="1">
-            <a:off x="4495800" y="2438400"/>
+            <a:off x="4800600" y="2438400"/>
             <a:ext cx="304800" cy="76200"/>
           </a:xfrm>
           <a:prstGeom prst="line">
@@ -9356,7 +9356,7 @@
         </p:nvSpPr>
         <p:spPr>
           <a:xfrm>
-            <a:off x="3124200" y="2743200"/>
+            <a:off x="3657600" y="2743200"/>
             <a:ext cx="1066800" cy="457200"/>
           </a:xfrm>
           <a:prstGeom prst="roundRect">
@@ -9418,14 +9418,12 @@
       <p:cxnSp>
         <p:nvCxnSpPr>
           <p:cNvPr id="15" name="Straight Connector 14"/>
-          <p:cNvCxnSpPr>
-            <a:stCxn id="14" idx="3"/>
-          </p:cNvCxnSpPr>
+          <p:cNvCxnSpPr/>
           <p:nvPr/>
         </p:nvCxnSpPr>
         <p:spPr>
           <a:xfrm>
-            <a:off x="4191000" y="2971800"/>
+            <a:off x="4724400" y="2971800"/>
             <a:ext cx="238125" cy="104775"/>
           </a:xfrm>
           <a:prstGeom prst="line">
@@ -9754,6 +9752,13 @@
   <p:clrMapOvr>
     <a:masterClrMapping/>
   </p:clrMapOvr>
+  <p:timing>
+    <p:tnLst>
+      <p:par>
+        <p:cTn id="1" dur="indefinite" restart="never" nodeType="tmRoot"/>
+      </p:par>
+    </p:tnLst>
+  </p:timing>
 </p:sld>
 </file>
 

</xml_diff>